<commit_message>
Sections 3.1 + 3.2 + corrections in background
</commit_message>
<xml_diff>
--- a/FAST2018-submission/LSM.pptx
+++ b/FAST2018-submission/LSM.pptx
@@ -5,11 +5,13 @@
     <p:sldMasterId id="2147483648" r:id="rId1"/>
   </p:sldMasterIdLst>
   <p:notesMasterIdLst>
-    <p:notesMasterId r:id="rId4"/>
+    <p:notesMasterId r:id="rId6"/>
   </p:notesMasterIdLst>
   <p:sldIdLst>
     <p:sldId id="259" r:id="rId2"/>
-    <p:sldId id="258" r:id="rId3"/>
+    <p:sldId id="261" r:id="rId3"/>
+    <p:sldId id="258" r:id="rId4"/>
+    <p:sldId id="260" r:id="rId5"/>
   </p:sldIdLst>
   <p:sldSz cx="9144000" cy="6858000" type="screen4x3"/>
   <p:notesSz cx="6858000" cy="9144000"/>
@@ -526,7 +528,7 @@
           <a:p>
             <a:fld id="{6298F978-E55D-114A-8147-E6ECAED6F122}" type="slidenum">
               <a:rPr lang="en-US" smtClean="0"/>
-              <a:t>2</a:t>
+              <a:t>3</a:t>
             </a:fld>
             <a:endParaRPr lang="en-US"/>
           </a:p>
@@ -3541,7 +3543,7 @@
         </p:nvCxnSpPr>
         <p:spPr>
           <a:xfrm flipH="1">
-            <a:off x="1995715" y="3557389"/>
+            <a:off x="1832428" y="3557389"/>
             <a:ext cx="5896428" cy="0"/>
           </a:xfrm>
           <a:prstGeom prst="line">
@@ -3574,7 +3576,7 @@
         </p:nvSpPr>
         <p:spPr>
           <a:xfrm>
-            <a:off x="6290867" y="2344956"/>
+            <a:off x="6127580" y="2344956"/>
             <a:ext cx="1639848" cy="1077218"/>
           </a:xfrm>
           <a:prstGeom prst="rect">
@@ -3605,7 +3607,7 @@
         </p:nvSpPr>
         <p:spPr>
           <a:xfrm>
-            <a:off x="6785433" y="3677004"/>
+            <a:off x="6622146" y="3677004"/>
             <a:ext cx="1121600" cy="1077218"/>
           </a:xfrm>
           <a:prstGeom prst="rect">
@@ -3636,8 +3638,8 @@
         </p:nvSpPr>
         <p:spPr>
           <a:xfrm>
-            <a:off x="2050143" y="1651006"/>
-            <a:ext cx="1814287" cy="954107"/>
+            <a:off x="3041342" y="1390849"/>
+            <a:ext cx="1790412" cy="954107"/>
           </a:xfrm>
           <a:prstGeom prst="rect">
             <a:avLst/>
@@ -3682,8 +3684,8 @@
         </p:nvSpPr>
         <p:spPr>
           <a:xfrm>
-            <a:off x="2050144" y="2816465"/>
-            <a:ext cx="1814286" cy="523220"/>
+            <a:off x="3017468" y="2463619"/>
+            <a:ext cx="1814286" cy="954107"/>
           </a:xfrm>
           <a:prstGeom prst="rect">
             <a:avLst/>
@@ -3706,8 +3708,12 @@
           <a:p>
             <a:pPr algn="ctr"/>
             <a:r>
+              <a:rPr lang="en-US" sz="2800" dirty="0"/>
+              <a:t>i</a:t>
+            </a:r>
+            <a:r>
               <a:rPr lang="en-US" sz="2800" dirty="0" smtClean="0"/>
-              <a:t>flat store</a:t>
+              <a:t>mmutable store</a:t>
             </a:r>
             <a:endParaRPr lang="en-US" sz="2800" dirty="0"/>
           </a:p>
@@ -3721,8 +3727,8 @@
         </p:nvSpPr>
         <p:spPr>
           <a:xfrm>
-            <a:off x="530885" y="2724869"/>
-            <a:ext cx="1016224" cy="584776"/>
+            <a:off x="1764609" y="2761155"/>
+            <a:ext cx="892467" cy="523220"/>
           </a:xfrm>
           <a:prstGeom prst="rect">
             <a:avLst/>
@@ -3736,10 +3742,10 @@
           <a:lstStyle/>
           <a:p>
             <a:r>
-              <a:rPr lang="en-US" sz="3200" dirty="0" smtClean="0"/>
+              <a:rPr lang="en-US" sz="2800" dirty="0" smtClean="0"/>
               <a:t>flush</a:t>
             </a:r>
-            <a:endParaRPr lang="en-US" sz="3200" dirty="0"/>
+            <a:endParaRPr lang="en-US" sz="2800" dirty="0"/>
           </a:p>
         </p:txBody>
       </p:sp>
@@ -3782,45 +3788,6 @@
           </a:p>
         </p:txBody>
       </p:sp>
-      <p:sp>
-        <p:nvSpPr>
-          <p:cNvPr id="10" name="TextBox 9"/>
-          <p:cNvSpPr txBox="1"/>
-          <p:nvPr/>
-        </p:nvSpPr>
-        <p:spPr>
-          <a:xfrm>
-            <a:off x="2075542" y="4424233"/>
-            <a:ext cx="3772637" cy="523220"/>
-          </a:xfrm>
-          <a:prstGeom prst="rect">
-            <a:avLst/>
-          </a:prstGeom>
-          <a:noFill/>
-          <a:ln>
-            <a:solidFill>
-              <a:schemeClr val="tx2">
-                <a:lumMod val="60000"/>
-                <a:lumOff val="40000"/>
-              </a:schemeClr>
-            </a:solidFill>
-          </a:ln>
-        </p:spPr>
-        <p:txBody>
-          <a:bodyPr wrap="square" rtlCol="0">
-            <a:spAutoFit/>
-          </a:bodyPr>
-          <a:lstStyle/>
-          <a:p>
-            <a:pPr algn="ctr"/>
-            <a:r>
-              <a:rPr lang="en-US" sz="2800" dirty="0" smtClean="0"/>
-              <a:t>file 2</a:t>
-            </a:r>
-            <a:endParaRPr lang="en-US" sz="2800" dirty="0"/>
-          </a:p>
-        </p:txBody>
-      </p:sp>
       <p:cxnSp>
         <p:nvCxnSpPr>
           <p:cNvPr id="11" name="Straight Connector 10"/>
@@ -3829,7 +3796,7 @@
         </p:nvCxnSpPr>
         <p:spPr>
           <a:xfrm flipV="1">
-            <a:off x="4129379" y="5074348"/>
+            <a:off x="4129379" y="4366771"/>
             <a:ext cx="0" cy="419186"/>
           </a:xfrm>
           <a:prstGeom prst="line">
@@ -3865,7 +3832,7 @@
         </p:nvSpPr>
         <p:spPr>
           <a:xfrm>
-            <a:off x="2082798" y="5647070"/>
+            <a:off x="2082798" y="4939493"/>
             <a:ext cx="3772637" cy="523220"/>
           </a:xfrm>
           <a:prstGeom prst="rect">
@@ -3904,7 +3871,7 @@
         </p:nvSpPr>
         <p:spPr>
           <a:xfrm>
-            <a:off x="1306287" y="1778007"/>
+            <a:off x="2340438" y="1505862"/>
             <a:ext cx="616858" cy="290281"/>
           </a:xfrm>
           <a:prstGeom prst="rightArrow">
@@ -3942,8 +3909,8 @@
         </p:nvSpPr>
         <p:spPr>
           <a:xfrm>
-            <a:off x="570302" y="1556083"/>
-            <a:ext cx="753331" cy="584776"/>
+            <a:off x="1727162" y="1349383"/>
+            <a:ext cx="682248" cy="523220"/>
           </a:xfrm>
           <a:prstGeom prst="rect">
             <a:avLst/>
@@ -3957,10 +3924,10 @@
           <a:lstStyle/>
           <a:p>
             <a:r>
-              <a:rPr lang="en-US" sz="3200" dirty="0" smtClean="0"/>
+              <a:rPr lang="en-US" sz="2800" dirty="0" smtClean="0"/>
               <a:t>put</a:t>
             </a:r>
-            <a:endParaRPr lang="en-US" sz="3200" dirty="0"/>
+            <a:endParaRPr lang="en-US" sz="2800" dirty="0"/>
           </a:p>
         </p:txBody>
       </p:sp>
@@ -3972,7 +3939,7 @@
         </p:nvSpPr>
         <p:spPr>
           <a:xfrm>
-            <a:off x="1341776" y="2276638"/>
+            <a:off x="2288286" y="2131494"/>
             <a:ext cx="568382" cy="809179"/>
           </a:xfrm>
           <a:prstGeom prst="curvedRightArrow">
@@ -4021,7 +3988,7 @@
         </p:nvSpPr>
         <p:spPr>
           <a:xfrm>
-            <a:off x="1330889" y="3154758"/>
+            <a:off x="2012878" y="3309645"/>
             <a:ext cx="568382" cy="809179"/>
           </a:xfrm>
           <a:prstGeom prst="curvedRightArrow">
@@ -4185,6 +4152,877 @@
 </file>
 
 <file path=ppt/slides/slide2.xml><?xml version="1.0" encoding="utf-8"?>
+<p:sld xmlns:a="http://schemas.openxmlformats.org/drawingml/2006/main" xmlns:r="http://schemas.openxmlformats.org/officeDocument/2006/relationships" xmlns:p="http://schemas.openxmlformats.org/presentationml/2006/main">
+  <p:cSld>
+    <p:spTree>
+      <p:nvGrpSpPr>
+        <p:cNvPr id="1" name=""/>
+        <p:cNvGrpSpPr/>
+        <p:nvPr/>
+      </p:nvGrpSpPr>
+      <p:grpSpPr>
+        <a:xfrm>
+          <a:off x="0" y="0"/>
+          <a:ext cx="0" cy="0"/>
+          <a:chOff x="0" y="0"/>
+          <a:chExt cx="0" cy="0"/>
+        </a:xfrm>
+      </p:grpSpPr>
+      <p:cxnSp>
+        <p:nvCxnSpPr>
+          <p:cNvPr id="2" name="Straight Connector 1"/>
+          <p:cNvCxnSpPr/>
+          <p:nvPr/>
+        </p:nvCxnSpPr>
+        <p:spPr>
+          <a:xfrm flipH="1">
+            <a:off x="1995715" y="4246823"/>
+            <a:ext cx="5896428" cy="0"/>
+          </a:xfrm>
+          <a:prstGeom prst="line">
+            <a:avLst/>
+          </a:prstGeom>
+          <a:ln>
+            <a:prstDash val="dash"/>
+          </a:ln>
+        </p:spPr>
+        <p:style>
+          <a:lnRef idx="2">
+            <a:schemeClr val="accent1"/>
+          </a:lnRef>
+          <a:fillRef idx="0">
+            <a:schemeClr val="accent1"/>
+          </a:fillRef>
+          <a:effectRef idx="1">
+            <a:schemeClr val="accent1"/>
+          </a:effectRef>
+          <a:fontRef idx="minor">
+            <a:schemeClr val="tx1"/>
+          </a:fontRef>
+        </p:style>
+      </p:cxnSp>
+      <p:sp>
+        <p:nvSpPr>
+          <p:cNvPr id="3" name="TextBox 2"/>
+          <p:cNvSpPr txBox="1"/>
+          <p:nvPr/>
+        </p:nvSpPr>
+        <p:spPr>
+          <a:xfrm>
+            <a:off x="6290867" y="3034390"/>
+            <a:ext cx="1639848" cy="1077218"/>
+          </a:xfrm>
+          <a:prstGeom prst="rect">
+            <a:avLst/>
+          </a:prstGeom>
+          <a:noFill/>
+        </p:spPr>
+        <p:txBody>
+          <a:bodyPr wrap="square" rtlCol="0">
+            <a:spAutoFit/>
+          </a:bodyPr>
+          <a:lstStyle/>
+          <a:p>
+            <a:pPr algn="r"/>
+            <a:r>
+              <a:rPr lang="en-US" sz="3200" dirty="0" smtClean="0"/>
+              <a:t>memory store </a:t>
+            </a:r>
+            <a:endParaRPr lang="en-US" sz="3200" dirty="0"/>
+          </a:p>
+        </p:txBody>
+      </p:sp>
+      <p:sp>
+        <p:nvSpPr>
+          <p:cNvPr id="4" name="TextBox 3"/>
+          <p:cNvSpPr txBox="1"/>
+          <p:nvPr/>
+        </p:nvSpPr>
+        <p:spPr>
+          <a:xfrm>
+            <a:off x="6785433" y="4366438"/>
+            <a:ext cx="1121600" cy="1077218"/>
+          </a:xfrm>
+          <a:prstGeom prst="rect">
+            <a:avLst/>
+          </a:prstGeom>
+          <a:noFill/>
+        </p:spPr>
+        <p:txBody>
+          <a:bodyPr wrap="square" rtlCol="0">
+            <a:spAutoFit/>
+          </a:bodyPr>
+          <a:lstStyle/>
+          <a:p>
+            <a:pPr algn="r"/>
+            <a:r>
+              <a:rPr lang="en-US" sz="3200" dirty="0" smtClean="0"/>
+              <a:t>disk store</a:t>
+            </a:r>
+            <a:endParaRPr lang="en-US" sz="3200" dirty="0"/>
+          </a:p>
+        </p:txBody>
+      </p:sp>
+      <p:sp>
+        <p:nvSpPr>
+          <p:cNvPr id="5" name="TextBox 4"/>
+          <p:cNvSpPr txBox="1"/>
+          <p:nvPr/>
+        </p:nvSpPr>
+        <p:spPr>
+          <a:xfrm>
+            <a:off x="3084294" y="1034144"/>
+            <a:ext cx="1814287" cy="523220"/>
+          </a:xfrm>
+          <a:prstGeom prst="rect">
+            <a:avLst/>
+          </a:prstGeom>
+          <a:noFill/>
+          <a:ln>
+            <a:solidFill>
+              <a:schemeClr val="tx2">
+                <a:lumMod val="60000"/>
+                <a:lumOff val="40000"/>
+              </a:schemeClr>
+            </a:solidFill>
+          </a:ln>
+        </p:spPr>
+        <p:txBody>
+          <a:bodyPr wrap="square" rtlCol="0">
+            <a:spAutoFit/>
+          </a:bodyPr>
+          <a:lstStyle/>
+          <a:p>
+            <a:pPr algn="ctr"/>
+            <a:r>
+              <a:rPr lang="en-US" sz="2800" dirty="0" smtClean="0"/>
+              <a:t>active</a:t>
+            </a:r>
+            <a:endParaRPr lang="en-US" sz="2800" dirty="0"/>
+          </a:p>
+        </p:txBody>
+      </p:sp>
+      <p:sp>
+        <p:nvSpPr>
+          <p:cNvPr id="6" name="TextBox 5"/>
+          <p:cNvSpPr txBox="1"/>
+          <p:nvPr/>
+        </p:nvSpPr>
+        <p:spPr>
+          <a:xfrm>
+            <a:off x="3084295" y="2943466"/>
+            <a:ext cx="1814286" cy="523220"/>
+          </a:xfrm>
+          <a:prstGeom prst="rect">
+            <a:avLst/>
+          </a:prstGeom>
+          <a:noFill/>
+          <a:ln>
+            <a:solidFill>
+              <a:schemeClr val="tx2">
+                <a:lumMod val="60000"/>
+                <a:lumOff val="40000"/>
+              </a:schemeClr>
+            </a:solidFill>
+          </a:ln>
+        </p:spPr>
+        <p:txBody>
+          <a:bodyPr wrap="square" rtlCol="0">
+            <a:spAutoFit/>
+          </a:bodyPr>
+          <a:lstStyle/>
+          <a:p>
+            <a:pPr algn="ctr"/>
+            <a:r>
+              <a:rPr lang="en-US" sz="2800" dirty="0" smtClean="0"/>
+              <a:t>flat store</a:t>
+            </a:r>
+            <a:endParaRPr lang="en-US" sz="2800" dirty="0"/>
+          </a:p>
+        </p:txBody>
+      </p:sp>
+      <p:sp>
+        <p:nvSpPr>
+          <p:cNvPr id="8" name="TextBox 7"/>
+          <p:cNvSpPr txBox="1"/>
+          <p:nvPr/>
+        </p:nvSpPr>
+        <p:spPr>
+          <a:xfrm>
+            <a:off x="1637608" y="3486875"/>
+            <a:ext cx="892467" cy="523220"/>
+          </a:xfrm>
+          <a:prstGeom prst="rect">
+            <a:avLst/>
+          </a:prstGeom>
+          <a:noFill/>
+        </p:spPr>
+        <p:txBody>
+          <a:bodyPr wrap="none" rtlCol="0">
+            <a:spAutoFit/>
+          </a:bodyPr>
+          <a:lstStyle/>
+          <a:p>
+            <a:r>
+              <a:rPr lang="en-US" sz="2800" dirty="0" smtClean="0"/>
+              <a:t>flush</a:t>
+            </a:r>
+            <a:endParaRPr lang="en-US" sz="2800" dirty="0"/>
+          </a:p>
+        </p:txBody>
+      </p:sp>
+      <p:sp>
+        <p:nvSpPr>
+          <p:cNvPr id="9" name="TextBox 8"/>
+          <p:cNvSpPr txBox="1"/>
+          <p:nvPr/>
+        </p:nvSpPr>
+        <p:spPr>
+          <a:xfrm>
+            <a:off x="2082798" y="4453263"/>
+            <a:ext cx="3831774" cy="523220"/>
+          </a:xfrm>
+          <a:prstGeom prst="rect">
+            <a:avLst/>
+          </a:prstGeom>
+          <a:noFill/>
+          <a:ln>
+            <a:solidFill>
+              <a:schemeClr val="tx2">
+                <a:lumMod val="60000"/>
+                <a:lumOff val="40000"/>
+              </a:schemeClr>
+            </a:solidFill>
+          </a:ln>
+        </p:spPr>
+        <p:txBody>
+          <a:bodyPr wrap="square" rtlCol="0">
+            <a:spAutoFit/>
+          </a:bodyPr>
+          <a:lstStyle/>
+          <a:p>
+            <a:pPr algn="ctr"/>
+            <a:r>
+              <a:rPr lang="en-US" sz="2800" dirty="0" smtClean="0"/>
+              <a:t>file 1</a:t>
+            </a:r>
+            <a:endParaRPr lang="en-US" sz="2800" dirty="0"/>
+          </a:p>
+        </p:txBody>
+      </p:sp>
+      <p:cxnSp>
+        <p:nvCxnSpPr>
+          <p:cNvPr id="11" name="Straight Connector 10"/>
+          <p:cNvCxnSpPr/>
+          <p:nvPr/>
+        </p:nvCxnSpPr>
+        <p:spPr>
+          <a:xfrm flipV="1">
+            <a:off x="4009574" y="5110634"/>
+            <a:ext cx="0" cy="419186"/>
+          </a:xfrm>
+          <a:prstGeom prst="line">
+            <a:avLst/>
+          </a:prstGeom>
+          <a:ln w="38100" cmpd="sng">
+            <a:solidFill>
+              <a:schemeClr val="tx1"/>
+            </a:solidFill>
+            <a:prstDash val="dot"/>
+          </a:ln>
+        </p:spPr>
+        <p:style>
+          <a:lnRef idx="2">
+            <a:schemeClr val="accent1"/>
+          </a:lnRef>
+          <a:fillRef idx="0">
+            <a:schemeClr val="accent1"/>
+          </a:fillRef>
+          <a:effectRef idx="1">
+            <a:schemeClr val="accent1"/>
+          </a:effectRef>
+          <a:fontRef idx="minor">
+            <a:schemeClr val="tx1"/>
+          </a:fontRef>
+        </p:style>
+      </p:cxnSp>
+      <p:sp>
+        <p:nvSpPr>
+          <p:cNvPr id="12" name="TextBox 11"/>
+          <p:cNvSpPr txBox="1"/>
+          <p:nvPr/>
+        </p:nvSpPr>
+        <p:spPr>
+          <a:xfrm>
+            <a:off x="2082799" y="5647070"/>
+            <a:ext cx="3831774" cy="523220"/>
+          </a:xfrm>
+          <a:prstGeom prst="rect">
+            <a:avLst/>
+          </a:prstGeom>
+          <a:noFill/>
+          <a:ln>
+            <a:solidFill>
+              <a:schemeClr val="tx2">
+                <a:lumMod val="60000"/>
+                <a:lumOff val="40000"/>
+              </a:schemeClr>
+            </a:solidFill>
+          </a:ln>
+        </p:spPr>
+        <p:txBody>
+          <a:bodyPr wrap="square" rtlCol="0">
+            <a:spAutoFit/>
+          </a:bodyPr>
+          <a:lstStyle/>
+          <a:p>
+            <a:pPr algn="ctr"/>
+            <a:r>
+              <a:rPr lang="en-US" sz="2800" dirty="0" smtClean="0"/>
+              <a:t>file n</a:t>
+            </a:r>
+            <a:endParaRPr lang="en-US" sz="2800" dirty="0"/>
+          </a:p>
+        </p:txBody>
+      </p:sp>
+      <p:sp>
+        <p:nvSpPr>
+          <p:cNvPr id="13" name="Right Arrow 12"/>
+          <p:cNvSpPr/>
+          <p:nvPr/>
+        </p:nvSpPr>
+        <p:spPr>
+          <a:xfrm>
+            <a:off x="2340438" y="1016001"/>
+            <a:ext cx="616858" cy="290281"/>
+          </a:xfrm>
+          <a:prstGeom prst="rightArrow">
+            <a:avLst/>
+          </a:prstGeom>
+        </p:spPr>
+        <p:style>
+          <a:lnRef idx="1">
+            <a:schemeClr val="accent1"/>
+          </a:lnRef>
+          <a:fillRef idx="3">
+            <a:schemeClr val="accent1"/>
+          </a:fillRef>
+          <a:effectRef idx="2">
+            <a:schemeClr val="accent1"/>
+          </a:effectRef>
+          <a:fontRef idx="minor">
+            <a:schemeClr val="lt1"/>
+          </a:fontRef>
+        </p:style>
+        <p:txBody>
+          <a:bodyPr rtlCol="0" anchor="ctr"/>
+          <a:lstStyle/>
+          <a:p>
+            <a:pPr algn="ctr"/>
+            <a:endParaRPr lang="en-US"/>
+          </a:p>
+        </p:txBody>
+      </p:sp>
+      <p:sp>
+        <p:nvSpPr>
+          <p:cNvPr id="14" name="TextBox 13"/>
+          <p:cNvSpPr txBox="1"/>
+          <p:nvPr/>
+        </p:nvSpPr>
+        <p:spPr>
+          <a:xfrm>
+            <a:off x="1637608" y="866649"/>
+            <a:ext cx="682248" cy="523220"/>
+          </a:xfrm>
+          <a:prstGeom prst="rect">
+            <a:avLst/>
+          </a:prstGeom>
+          <a:noFill/>
+        </p:spPr>
+        <p:txBody>
+          <a:bodyPr wrap="none" rtlCol="0">
+            <a:spAutoFit/>
+          </a:bodyPr>
+          <a:lstStyle/>
+          <a:p>
+            <a:r>
+              <a:rPr lang="en-US" sz="2800" dirty="0" smtClean="0"/>
+              <a:t>put</a:t>
+            </a:r>
+            <a:endParaRPr lang="en-US" sz="2800" dirty="0"/>
+          </a:p>
+        </p:txBody>
+      </p:sp>
+      <p:sp>
+        <p:nvSpPr>
+          <p:cNvPr id="16" name="Curved Right Arrow 15"/>
+          <p:cNvSpPr/>
+          <p:nvPr/>
+        </p:nvSpPr>
+        <p:spPr>
+          <a:xfrm>
+            <a:off x="2365040" y="3844192"/>
+            <a:ext cx="568382" cy="809179"/>
+          </a:xfrm>
+          <a:prstGeom prst="curvedRightArrow">
+            <a:avLst>
+              <a:gd name="adj1" fmla="val 25000"/>
+              <a:gd name="adj2" fmla="val 36202"/>
+              <a:gd name="adj3" fmla="val 25000"/>
+            </a:avLst>
+          </a:prstGeom>
+          <a:solidFill>
+            <a:srgbClr val="95B3D7"/>
+          </a:solidFill>
+        </p:spPr>
+        <p:style>
+          <a:lnRef idx="1">
+            <a:schemeClr val="accent1"/>
+          </a:lnRef>
+          <a:fillRef idx="3">
+            <a:schemeClr val="accent1"/>
+          </a:fillRef>
+          <a:effectRef idx="2">
+            <a:schemeClr val="accent1"/>
+          </a:effectRef>
+          <a:fontRef idx="minor">
+            <a:schemeClr val="lt1"/>
+          </a:fontRef>
+        </p:style>
+        <p:txBody>
+          <a:bodyPr rtlCol="0" anchor="ctr"/>
+          <a:lstStyle/>
+          <a:p>
+            <a:pPr algn="ctr"/>
+            <a:endParaRPr lang="en-US">
+              <a:solidFill>
+                <a:schemeClr val="tx1"/>
+              </a:solidFill>
+            </a:endParaRPr>
+          </a:p>
+        </p:txBody>
+      </p:sp>
+      <p:sp>
+        <p:nvSpPr>
+          <p:cNvPr id="17" name="TextBox 16"/>
+          <p:cNvSpPr txBox="1"/>
+          <p:nvPr/>
+        </p:nvSpPr>
+        <p:spPr>
+          <a:xfrm>
+            <a:off x="3073408" y="1753284"/>
+            <a:ext cx="1814286" cy="523220"/>
+          </a:xfrm>
+          <a:prstGeom prst="rect">
+            <a:avLst/>
+          </a:prstGeom>
+          <a:noFill/>
+          <a:ln>
+            <a:solidFill>
+              <a:schemeClr val="tx2">
+                <a:lumMod val="60000"/>
+                <a:lumOff val="40000"/>
+              </a:schemeClr>
+            </a:solidFill>
+          </a:ln>
+        </p:spPr>
+        <p:txBody>
+          <a:bodyPr wrap="square" rtlCol="0">
+            <a:spAutoFit/>
+          </a:bodyPr>
+          <a:lstStyle/>
+          <a:p>
+            <a:pPr algn="ctr"/>
+            <a:r>
+              <a:rPr lang="en-US" sz="2800" dirty="0" smtClean="0"/>
+              <a:t>flat store</a:t>
+            </a:r>
+            <a:endParaRPr lang="en-US" sz="2800" dirty="0"/>
+          </a:p>
+        </p:txBody>
+      </p:sp>
+      <p:cxnSp>
+        <p:nvCxnSpPr>
+          <p:cNvPr id="18" name="Straight Connector 17"/>
+          <p:cNvCxnSpPr/>
+          <p:nvPr/>
+        </p:nvCxnSpPr>
+        <p:spPr>
+          <a:xfrm flipV="1">
+            <a:off x="3973422" y="2349210"/>
+            <a:ext cx="0" cy="419186"/>
+          </a:xfrm>
+          <a:prstGeom prst="line">
+            <a:avLst/>
+          </a:prstGeom>
+          <a:ln w="38100" cmpd="sng">
+            <a:solidFill>
+              <a:schemeClr val="tx1"/>
+            </a:solidFill>
+            <a:prstDash val="dot"/>
+          </a:ln>
+        </p:spPr>
+        <p:style>
+          <a:lnRef idx="2">
+            <a:schemeClr val="accent1"/>
+          </a:lnRef>
+          <a:fillRef idx="0">
+            <a:schemeClr val="accent1"/>
+          </a:fillRef>
+          <a:effectRef idx="1">
+            <a:schemeClr val="accent1"/>
+          </a:effectRef>
+          <a:fontRef idx="minor">
+            <a:schemeClr val="tx1"/>
+          </a:fontRef>
+        </p:style>
+      </p:cxnSp>
+      <p:sp>
+        <p:nvSpPr>
+          <p:cNvPr id="19" name="Curved Right Arrow 18"/>
+          <p:cNvSpPr/>
+          <p:nvPr/>
+        </p:nvSpPr>
+        <p:spPr>
+          <a:xfrm>
+            <a:off x="2388914" y="1365945"/>
+            <a:ext cx="568382" cy="809179"/>
+          </a:xfrm>
+          <a:prstGeom prst="curvedRightArrow">
+            <a:avLst>
+              <a:gd name="adj1" fmla="val 25000"/>
+              <a:gd name="adj2" fmla="val 36202"/>
+              <a:gd name="adj3" fmla="val 25000"/>
+            </a:avLst>
+          </a:prstGeom>
+          <a:solidFill>
+            <a:srgbClr val="95B3D7"/>
+          </a:solidFill>
+        </p:spPr>
+        <p:style>
+          <a:lnRef idx="1">
+            <a:schemeClr val="accent1"/>
+          </a:lnRef>
+          <a:fillRef idx="3">
+            <a:schemeClr val="accent1"/>
+          </a:fillRef>
+          <a:effectRef idx="2">
+            <a:schemeClr val="accent1"/>
+          </a:effectRef>
+          <a:fontRef idx="minor">
+            <a:schemeClr val="lt1"/>
+          </a:fontRef>
+        </p:style>
+        <p:txBody>
+          <a:bodyPr rtlCol="0" anchor="ctr"/>
+          <a:lstStyle/>
+          <a:p>
+            <a:pPr algn="ctr"/>
+            <a:endParaRPr lang="en-US">
+              <a:solidFill>
+                <a:schemeClr val="tx1"/>
+              </a:solidFill>
+            </a:endParaRPr>
+          </a:p>
+        </p:txBody>
+      </p:sp>
+      <p:sp>
+        <p:nvSpPr>
+          <p:cNvPr id="20" name="TextBox 19"/>
+          <p:cNvSpPr txBox="1"/>
+          <p:nvPr/>
+        </p:nvSpPr>
+        <p:spPr>
+          <a:xfrm>
+            <a:off x="3066279" y="3582582"/>
+            <a:ext cx="1814286" cy="523220"/>
+          </a:xfrm>
+          <a:prstGeom prst="rect">
+            <a:avLst/>
+          </a:prstGeom>
+          <a:noFill/>
+          <a:ln>
+            <a:solidFill>
+              <a:schemeClr val="tx2">
+                <a:lumMod val="60000"/>
+                <a:lumOff val="40000"/>
+              </a:schemeClr>
+            </a:solidFill>
+          </a:ln>
+        </p:spPr>
+        <p:txBody>
+          <a:bodyPr wrap="square" rtlCol="0">
+            <a:spAutoFit/>
+          </a:bodyPr>
+          <a:lstStyle/>
+          <a:p>
+            <a:pPr algn="ctr"/>
+            <a:r>
+              <a:rPr lang="en-US" sz="2800" dirty="0" smtClean="0"/>
+              <a:t>flat store</a:t>
+            </a:r>
+            <a:endParaRPr lang="en-US" sz="2800" dirty="0"/>
+          </a:p>
+        </p:txBody>
+      </p:sp>
+      <p:sp>
+        <p:nvSpPr>
+          <p:cNvPr id="7" name="Right Brace 6"/>
+          <p:cNvSpPr/>
+          <p:nvPr/>
+        </p:nvSpPr>
+        <p:spPr>
+          <a:xfrm>
+            <a:off x="4989296" y="1753284"/>
+            <a:ext cx="671280" cy="1713402"/>
+          </a:xfrm>
+          <a:prstGeom prst="rightBrace">
+            <a:avLst/>
+          </a:prstGeom>
+        </p:spPr>
+        <p:style>
+          <a:lnRef idx="2">
+            <a:schemeClr val="accent1"/>
+          </a:lnRef>
+          <a:fillRef idx="0">
+            <a:schemeClr val="accent1"/>
+          </a:fillRef>
+          <a:effectRef idx="1">
+            <a:schemeClr val="accent1"/>
+          </a:effectRef>
+          <a:fontRef idx="minor">
+            <a:schemeClr val="tx1"/>
+          </a:fontRef>
+        </p:style>
+        <p:txBody>
+          <a:bodyPr rtlCol="0" anchor="ctr"/>
+          <a:lstStyle/>
+          <a:p>
+            <a:pPr algn="ctr"/>
+            <a:endParaRPr lang="en-US"/>
+          </a:p>
+        </p:txBody>
+      </p:sp>
+      <p:sp>
+        <p:nvSpPr>
+          <p:cNvPr id="21" name="Rectangle 20"/>
+          <p:cNvSpPr/>
+          <p:nvPr/>
+        </p:nvSpPr>
+        <p:spPr>
+          <a:xfrm rot="5400000">
+            <a:off x="5223348" y="2305316"/>
+            <a:ext cx="1355159" cy="523220"/>
+          </a:xfrm>
+          <a:prstGeom prst="rect">
+            <a:avLst/>
+          </a:prstGeom>
+        </p:spPr>
+        <p:txBody>
+          <a:bodyPr wrap="none">
+            <a:spAutoFit/>
+          </a:bodyPr>
+          <a:lstStyle/>
+          <a:p>
+            <a:r>
+              <a:rPr lang="en-US" sz="2800" dirty="0" smtClean="0">
+                <a:solidFill>
+                  <a:prstClr val="black"/>
+                </a:solidFill>
+              </a:rPr>
+              <a:t>pipeline</a:t>
+            </a:r>
+            <a:endParaRPr lang="en-US" dirty="0"/>
+          </a:p>
+        </p:txBody>
+      </p:sp>
+      <p:sp>
+        <p:nvSpPr>
+          <p:cNvPr id="22" name="TextBox 21"/>
+          <p:cNvSpPr txBox="1"/>
+          <p:nvPr/>
+        </p:nvSpPr>
+        <p:spPr>
+          <a:xfrm>
+            <a:off x="1637608" y="2166792"/>
+            <a:ext cx="1800493" cy="954107"/>
+          </a:xfrm>
+          <a:prstGeom prst="rect">
+            <a:avLst/>
+          </a:prstGeom>
+          <a:noFill/>
+        </p:spPr>
+        <p:txBody>
+          <a:bodyPr wrap="none" rtlCol="0">
+            <a:spAutoFit/>
+          </a:bodyPr>
+          <a:lstStyle/>
+          <a:p>
+            <a:r>
+              <a:rPr lang="en-US" sz="2800" dirty="0" smtClean="0"/>
+              <a:t>in-memory</a:t>
+            </a:r>
+          </a:p>
+          <a:p>
+            <a:r>
+              <a:rPr lang="en-US" sz="2800" dirty="0" smtClean="0"/>
+              <a:t>flush</a:t>
+            </a:r>
+            <a:endParaRPr lang="en-US" sz="2800" dirty="0"/>
+          </a:p>
+        </p:txBody>
+      </p:sp>
+    </p:spTree>
+    <p:extLst>
+      <p:ext uri="{BB962C8B-B14F-4D97-AF65-F5344CB8AC3E}">
+        <p14:creationId xmlns:p14="http://schemas.microsoft.com/office/powerpoint/2010/main" val="3406185832"/>
+      </p:ext>
+    </p:extLst>
+  </p:cSld>
+  <p:clrMapOvr>
+    <a:masterClrMapping/>
+  </p:clrMapOvr>
+  <p:timing>
+    <p:tnLst>
+      <p:par>
+        <p:cTn xmlns:p14="http://schemas.microsoft.com/office/powerpoint/2010/main" id="1" dur="indefinite" restart="never" nodeType="tmRoot">
+          <p:childTnLst>
+            <p:seq concurrent="1" nextAc="seek">
+              <p:cTn id="2" dur="indefinite" nodeType="mainSeq">
+                <p:childTnLst>
+                  <p:par>
+                    <p:cTn id="3" fill="hold">
+                      <p:stCondLst>
+                        <p:cond delay="indefinite"/>
+                        <p:cond evt="onBegin" delay="0">
+                          <p:tn val="2"/>
+                        </p:cond>
+                      </p:stCondLst>
+                      <p:childTnLst>
+                        <p:par>
+                          <p:cTn id="4" fill="hold">
+                            <p:stCondLst>
+                              <p:cond delay="0"/>
+                            </p:stCondLst>
+                            <p:childTnLst>
+                              <p:par>
+                                <p:cTn id="5" presetID="1" presetClass="entr" presetSubtype="0" fill="hold" grpId="0" nodeType="withEffect">
+                                  <p:stCondLst>
+                                    <p:cond delay="0"/>
+                                  </p:stCondLst>
+                                  <p:childTnLst>
+                                    <p:set>
+                                      <p:cBhvr>
+                                        <p:cTn id="6" dur="1" fill="hold">
+                                          <p:stCondLst>
+                                            <p:cond delay="0"/>
+                                          </p:stCondLst>
+                                        </p:cTn>
+                                        <p:tgtEl>
+                                          <p:spTgt spid="8"/>
+                                        </p:tgtEl>
+                                        <p:attrNameLst>
+                                          <p:attrName>style.visibility</p:attrName>
+                                        </p:attrNameLst>
+                                      </p:cBhvr>
+                                      <p:to>
+                                        <p:strVal val="visible"/>
+                                      </p:to>
+                                    </p:set>
+                                  </p:childTnLst>
+                                </p:cTn>
+                              </p:par>
+                              <p:par>
+                                <p:cTn id="7" presetID="1" presetClass="entr" presetSubtype="0" fill="hold" grpId="0" nodeType="withEffect">
+                                  <p:stCondLst>
+                                    <p:cond delay="0"/>
+                                  </p:stCondLst>
+                                  <p:childTnLst>
+                                    <p:set>
+                                      <p:cBhvr>
+                                        <p:cTn id="8" dur="1" fill="hold">
+                                          <p:stCondLst>
+                                            <p:cond delay="0"/>
+                                          </p:stCondLst>
+                                        </p:cTn>
+                                        <p:tgtEl>
+                                          <p:spTgt spid="14"/>
+                                        </p:tgtEl>
+                                        <p:attrNameLst>
+                                          <p:attrName>style.visibility</p:attrName>
+                                        </p:attrNameLst>
+                                      </p:cBhvr>
+                                      <p:to>
+                                        <p:strVal val="visible"/>
+                                      </p:to>
+                                    </p:set>
+                                  </p:childTnLst>
+                                </p:cTn>
+                              </p:par>
+                              <p:par>
+                                <p:cTn id="9" presetID="1" presetClass="entr" presetSubtype="0" fill="hold" grpId="0" nodeType="withEffect">
+                                  <p:stCondLst>
+                                    <p:cond delay="0"/>
+                                  </p:stCondLst>
+                                  <p:childTnLst>
+                                    <p:set>
+                                      <p:cBhvr>
+                                        <p:cTn id="10" dur="1" fill="hold">
+                                          <p:stCondLst>
+                                            <p:cond delay="0"/>
+                                          </p:stCondLst>
+                                        </p:cTn>
+                                        <p:tgtEl>
+                                          <p:spTgt spid="22"/>
+                                        </p:tgtEl>
+                                        <p:attrNameLst>
+                                          <p:attrName>style.visibility</p:attrName>
+                                        </p:attrNameLst>
+                                      </p:cBhvr>
+                                      <p:to>
+                                        <p:strVal val="visible"/>
+                                      </p:to>
+                                    </p:set>
+                                  </p:childTnLst>
+                                </p:cTn>
+                              </p:par>
+                            </p:childTnLst>
+                          </p:cTn>
+                        </p:par>
+                      </p:childTnLst>
+                    </p:cTn>
+                  </p:par>
+                </p:childTnLst>
+              </p:cTn>
+              <p:prevCondLst>
+                <p:cond evt="onPrev" delay="0">
+                  <p:tgtEl>
+                    <p:sldTgt/>
+                  </p:tgtEl>
+                </p:cond>
+              </p:prevCondLst>
+              <p:nextCondLst>
+                <p:cond evt="onNext" delay="0">
+                  <p:tgtEl>
+                    <p:sldTgt/>
+                  </p:tgtEl>
+                </p:cond>
+              </p:nextCondLst>
+            </p:seq>
+          </p:childTnLst>
+        </p:cTn>
+      </p:par>
+    </p:tnLst>
+    <p:bldLst>
+      <p:bldP spid="8" grpId="0"/>
+      <p:bldP spid="14" grpId="0"/>
+      <p:bldP spid="22" grpId="0"/>
+    </p:bldLst>
+  </p:timing>
+</p:sld>
+</file>
+
+<file path=ppt/slides/slide3.xml><?xml version="1.0" encoding="utf-8"?>
 <p:sld xmlns:a="http://schemas.openxmlformats.org/drawingml/2006/main" xmlns:r="http://schemas.openxmlformats.org/officeDocument/2006/relationships" xmlns:p="http://schemas.openxmlformats.org/presentationml/2006/main">
   <p:cSld>
     <p:spTree>
@@ -5037,6 +5875,114 @@
       <p:bldP spid="33" grpId="0"/>
     </p:bldLst>
   </p:timing>
+</p:sld>
+</file>
+
+<file path=ppt/slides/slide4.xml><?xml version="1.0" encoding="utf-8"?>
+<p:sld xmlns:a="http://schemas.openxmlformats.org/drawingml/2006/main" xmlns:r="http://schemas.openxmlformats.org/officeDocument/2006/relationships" xmlns:p="http://schemas.openxmlformats.org/presentationml/2006/main">
+  <p:cSld>
+    <p:spTree>
+      <p:nvGrpSpPr>
+        <p:cNvPr id="1" name=""/>
+        <p:cNvGrpSpPr/>
+        <p:nvPr/>
+      </p:nvGrpSpPr>
+      <p:grpSpPr>
+        <a:xfrm>
+          <a:off x="0" y="0"/>
+          <a:ext cx="0" cy="0"/>
+          <a:chOff x="0" y="0"/>
+          <a:chExt cx="0" cy="0"/>
+        </a:xfrm>
+      </p:grpSpPr>
+      <p:sp>
+        <p:nvSpPr>
+          <p:cNvPr id="2" name="TextBox 1"/>
+          <p:cNvSpPr txBox="1"/>
+          <p:nvPr/>
+        </p:nvSpPr>
+        <p:spPr>
+          <a:xfrm>
+            <a:off x="2050143" y="1651006"/>
+            <a:ext cx="1814287" cy="523220"/>
+          </a:xfrm>
+          <a:prstGeom prst="rect">
+            <a:avLst/>
+          </a:prstGeom>
+          <a:noFill/>
+          <a:ln>
+            <a:solidFill>
+              <a:schemeClr val="tx2">
+                <a:lumMod val="60000"/>
+                <a:lumOff val="40000"/>
+              </a:schemeClr>
+            </a:solidFill>
+          </a:ln>
+        </p:spPr>
+        <p:txBody>
+          <a:bodyPr wrap="square" rtlCol="0">
+            <a:spAutoFit/>
+          </a:bodyPr>
+          <a:lstStyle/>
+          <a:p>
+            <a:pPr algn="ctr"/>
+            <a:r>
+              <a:rPr lang="en-US" sz="2800" dirty="0" err="1" smtClean="0"/>
+              <a:t>memstore</a:t>
+            </a:r>
+            <a:endParaRPr lang="en-US" sz="2800" dirty="0"/>
+          </a:p>
+        </p:txBody>
+      </p:sp>
+      <p:sp>
+        <p:nvSpPr>
+          <p:cNvPr id="3" name="TextBox 2"/>
+          <p:cNvSpPr txBox="1"/>
+          <p:nvPr/>
+        </p:nvSpPr>
+        <p:spPr>
+          <a:xfrm>
+            <a:off x="2050144" y="2554855"/>
+            <a:ext cx="1814286" cy="523220"/>
+          </a:xfrm>
+          <a:prstGeom prst="rect">
+            <a:avLst/>
+          </a:prstGeom>
+          <a:noFill/>
+          <a:ln>
+            <a:solidFill>
+              <a:schemeClr val="tx2">
+                <a:lumMod val="60000"/>
+                <a:lumOff val="40000"/>
+              </a:schemeClr>
+            </a:solidFill>
+          </a:ln>
+        </p:spPr>
+        <p:txBody>
+          <a:bodyPr wrap="square" rtlCol="0">
+            <a:spAutoFit/>
+          </a:bodyPr>
+          <a:lstStyle/>
+          <a:p>
+            <a:pPr algn="ctr"/>
+            <a:r>
+              <a:rPr lang="en-US" sz="2800" dirty="0" err="1" smtClean="0"/>
+              <a:t>HStore</a:t>
+            </a:r>
+            <a:endParaRPr lang="en-US" sz="2800" dirty="0"/>
+          </a:p>
+        </p:txBody>
+      </p:sp>
+    </p:spTree>
+    <p:extLst>
+      <p:ext uri="{BB962C8B-B14F-4D97-AF65-F5344CB8AC3E}">
+        <p14:creationId xmlns:p14="http://schemas.microsoft.com/office/powerpoint/2010/main" val="3150304816"/>
+      </p:ext>
+    </p:extLst>
+  </p:cSld>
+  <p:clrMapOvr>
+    <a:masterClrMapping/>
+  </p:clrMapOvr>
 </p:sld>
 </file>
 

</xml_diff>

<commit_message>
revised intro, moved footnotes to references
</commit_message>
<xml_diff>
--- a/FAST2018-submission/LSM.pptx
+++ b/FAST2018-submission/LSM.pptx
@@ -195,7 +195,7 @@
           <a:p>
             <a:fld id="{2D6E3885-AA8A-D94C-9C8E-6B5181794B7D}" type="datetimeFigureOut">
               <a:rPr lang="en-US" smtClean="0"/>
-              <a:t>9/21/17</a:t>
+              <a:t>9/26/17</a:t>
             </a:fld>
             <a:endParaRPr lang="en-US"/>
           </a:p>
@@ -728,7 +728,7 @@
           <a:p>
             <a:fld id="{10F5D1E9-1EA1-9144-BBEF-9E786EB7675B}" type="datetimeFigureOut">
               <a:rPr lang="en-US" smtClean="0"/>
-              <a:t>9/21/17</a:t>
+              <a:t>9/26/17</a:t>
             </a:fld>
             <a:endParaRPr lang="en-US"/>
           </a:p>
@@ -898,7 +898,7 @@
           <a:p>
             <a:fld id="{10F5D1E9-1EA1-9144-BBEF-9E786EB7675B}" type="datetimeFigureOut">
               <a:rPr lang="en-US" smtClean="0"/>
-              <a:t>9/21/17</a:t>
+              <a:t>9/26/17</a:t>
             </a:fld>
             <a:endParaRPr lang="en-US"/>
           </a:p>
@@ -1078,7 +1078,7 @@
           <a:p>
             <a:fld id="{10F5D1E9-1EA1-9144-BBEF-9E786EB7675B}" type="datetimeFigureOut">
               <a:rPr lang="en-US" smtClean="0"/>
-              <a:t>9/21/17</a:t>
+              <a:t>9/26/17</a:t>
             </a:fld>
             <a:endParaRPr lang="en-US"/>
           </a:p>
@@ -1248,7 +1248,7 @@
           <a:p>
             <a:fld id="{10F5D1E9-1EA1-9144-BBEF-9E786EB7675B}" type="datetimeFigureOut">
               <a:rPr lang="en-US" smtClean="0"/>
-              <a:t>9/21/17</a:t>
+              <a:t>9/26/17</a:t>
             </a:fld>
             <a:endParaRPr lang="en-US"/>
           </a:p>
@@ -1494,7 +1494,7 @@
           <a:p>
             <a:fld id="{10F5D1E9-1EA1-9144-BBEF-9E786EB7675B}" type="datetimeFigureOut">
               <a:rPr lang="en-US" smtClean="0"/>
-              <a:t>9/21/17</a:t>
+              <a:t>9/26/17</a:t>
             </a:fld>
             <a:endParaRPr lang="en-US"/>
           </a:p>
@@ -1782,7 +1782,7 @@
           <a:p>
             <a:fld id="{10F5D1E9-1EA1-9144-BBEF-9E786EB7675B}" type="datetimeFigureOut">
               <a:rPr lang="en-US" smtClean="0"/>
-              <a:t>9/21/17</a:t>
+              <a:t>9/26/17</a:t>
             </a:fld>
             <a:endParaRPr lang="en-US"/>
           </a:p>
@@ -2204,7 +2204,7 @@
           <a:p>
             <a:fld id="{10F5D1E9-1EA1-9144-BBEF-9E786EB7675B}" type="datetimeFigureOut">
               <a:rPr lang="en-US" smtClean="0"/>
-              <a:t>9/21/17</a:t>
+              <a:t>9/26/17</a:t>
             </a:fld>
             <a:endParaRPr lang="en-US"/>
           </a:p>
@@ -2322,7 +2322,7 @@
           <a:p>
             <a:fld id="{10F5D1E9-1EA1-9144-BBEF-9E786EB7675B}" type="datetimeFigureOut">
               <a:rPr lang="en-US" smtClean="0"/>
-              <a:t>9/21/17</a:t>
+              <a:t>9/26/17</a:t>
             </a:fld>
             <a:endParaRPr lang="en-US"/>
           </a:p>
@@ -2417,7 +2417,7 @@
           <a:p>
             <a:fld id="{10F5D1E9-1EA1-9144-BBEF-9E786EB7675B}" type="datetimeFigureOut">
               <a:rPr lang="en-US" smtClean="0"/>
-              <a:t>9/21/17</a:t>
+              <a:t>9/26/17</a:t>
             </a:fld>
             <a:endParaRPr lang="en-US"/>
           </a:p>
@@ -2694,7 +2694,7 @@
           <a:p>
             <a:fld id="{10F5D1E9-1EA1-9144-BBEF-9E786EB7675B}" type="datetimeFigureOut">
               <a:rPr lang="en-US" smtClean="0"/>
-              <a:t>9/21/17</a:t>
+              <a:t>9/26/17</a:t>
             </a:fld>
             <a:endParaRPr lang="en-US"/>
           </a:p>
@@ -2947,7 +2947,7 @@
           <a:p>
             <a:fld id="{10F5D1E9-1EA1-9144-BBEF-9E786EB7675B}" type="datetimeFigureOut">
               <a:rPr lang="en-US" smtClean="0"/>
-              <a:t>9/21/17</a:t>
+              <a:t>9/26/17</a:t>
             </a:fld>
             <a:endParaRPr lang="en-US"/>
           </a:p>
@@ -3160,7 +3160,7 @@
           <a:p>
             <a:fld id="{10F5D1E9-1EA1-9144-BBEF-9E786EB7675B}" type="datetimeFigureOut">
               <a:rPr lang="en-US" smtClean="0"/>
-              <a:t>9/21/17</a:t>
+              <a:t>9/26/17</a:t>
             </a:fld>
             <a:endParaRPr lang="en-US"/>
           </a:p>
@@ -3702,8 +3702,11 @@
             <a:pPr algn="ctr"/>
             <a:r>
               <a:rPr lang="en-US" sz="2800" dirty="0" smtClean="0"/>
-              <a:t>Frozen buffer</a:t>
-            </a:r>
+              <a:t>Snapshot</a:t>
+            </a:r>
+          </a:p>
+          <a:p>
+            <a:pPr algn="ctr"/>
             <a:endParaRPr lang="en-US" sz="2800" dirty="0"/>
           </a:p>
         </p:txBody>
@@ -3716,7 +3719,7 @@
         </p:nvSpPr>
         <p:spPr>
           <a:xfrm>
-            <a:off x="1120411" y="3438262"/>
+            <a:off x="1749053" y="2750139"/>
             <a:ext cx="892467" cy="523220"/>
           </a:xfrm>
           <a:prstGeom prst="rect">
@@ -3770,8 +3773,12 @@
           <a:p>
             <a:pPr algn="ctr"/>
             <a:r>
+              <a:rPr lang="en-US" sz="2800" dirty="0" err="1" smtClean="0"/>
+              <a:t>HFile</a:t>
+            </a:r>
+            <a:r>
               <a:rPr lang="en-US" sz="2800" dirty="0" smtClean="0"/>
-              <a:t>HFile1</a:t>
+              <a:t> 1</a:t>
             </a:r>
             <a:endParaRPr lang="en-US" sz="2800" dirty="0"/>
           </a:p>
@@ -4264,7 +4271,7 @@
         </p:nvSpPr>
         <p:spPr>
           <a:xfrm>
-            <a:off x="2337254" y="660664"/>
+            <a:off x="2409826" y="660664"/>
             <a:ext cx="2070148" cy="954107"/>
           </a:xfrm>
           <a:prstGeom prst="rect">
@@ -4303,7 +4310,7 @@
         </p:nvSpPr>
         <p:spPr>
           <a:xfrm>
-            <a:off x="890568" y="3486875"/>
+            <a:off x="890568" y="3559447"/>
             <a:ext cx="892467" cy="523220"/>
           </a:xfrm>
           <a:prstGeom prst="rect">
@@ -4572,7 +4579,7 @@
         </p:nvSpPr>
         <p:spPr>
           <a:xfrm>
-            <a:off x="2326367" y="1753284"/>
+            <a:off x="2398939" y="1753284"/>
             <a:ext cx="2081035" cy="523220"/>
           </a:xfrm>
           <a:prstGeom prst="rect">
@@ -4611,7 +4618,7 @@
         </p:nvCxnSpPr>
         <p:spPr>
           <a:xfrm flipV="1">
-            <a:off x="3226382" y="2349210"/>
+            <a:off x="3298954" y="2349210"/>
             <a:ext cx="0" cy="419186"/>
           </a:xfrm>
           <a:prstGeom prst="line">
@@ -4648,7 +4655,7 @@
         <p:spPr>
           <a:xfrm>
             <a:off x="1641874" y="1365945"/>
-            <a:ext cx="568382" cy="809179"/>
+            <a:ext cx="568382" cy="910559"/>
           </a:xfrm>
           <a:prstGeom prst="curvedRightArrow">
             <a:avLst>
@@ -4696,7 +4703,7 @@
         </p:nvSpPr>
         <p:spPr>
           <a:xfrm>
-            <a:off x="4559748" y="1790631"/>
+            <a:off x="4632320" y="1790631"/>
             <a:ext cx="671280" cy="2053561"/>
           </a:xfrm>
           <a:prstGeom prst="rightBrace">
@@ -4734,7 +4741,7 @@
         </p:nvSpPr>
         <p:spPr>
           <a:xfrm rot="5400000">
-            <a:off x="4924532" y="2604100"/>
+            <a:off x="4997104" y="2604100"/>
             <a:ext cx="1355159" cy="523220"/>
           </a:xfrm>
           <a:prstGeom prst="rect">
@@ -4767,7 +4774,7 @@
         </p:nvSpPr>
         <p:spPr>
           <a:xfrm>
-            <a:off x="890568" y="2166792"/>
+            <a:off x="890568" y="2112363"/>
             <a:ext cx="1800493" cy="954107"/>
           </a:xfrm>
           <a:prstGeom prst="rect">
@@ -4803,7 +4810,7 @@
         </p:nvSpPr>
         <p:spPr>
           <a:xfrm>
-            <a:off x="2337254" y="2943466"/>
+            <a:off x="2409826" y="2943466"/>
             <a:ext cx="2081035" cy="523220"/>
           </a:xfrm>
           <a:prstGeom prst="rect">
@@ -4842,7 +4849,7 @@
         </p:nvSpPr>
         <p:spPr>
           <a:xfrm>
-            <a:off x="2310683" y="3530322"/>
+            <a:off x="2383255" y="3530322"/>
             <a:ext cx="2107606" cy="523220"/>
           </a:xfrm>
           <a:prstGeom prst="rect">

</xml_diff>

<commit_message>
Change of Figure 2
</commit_message>
<xml_diff>
--- a/FAST2018-submission/LSM.pptx
+++ b/FAST2018-submission/LSM.pptx
@@ -4703,11 +4703,14 @@
         </p:nvSpPr>
         <p:spPr>
           <a:xfrm>
-            <a:off x="4632320" y="1790631"/>
-            <a:ext cx="671280" cy="2053561"/>
+            <a:off x="4652180" y="1790631"/>
+            <a:ext cx="437599" cy="2262911"/>
           </a:xfrm>
           <a:prstGeom prst="rightBrace">
-            <a:avLst/>
+            <a:avLst>
+              <a:gd name="adj1" fmla="val 30123"/>
+              <a:gd name="adj2" fmla="val 50000"/>
+            </a:avLst>
           </a:prstGeom>
         </p:spPr>
         <p:style>
@@ -4741,7 +4744,7 @@
         </p:nvSpPr>
         <p:spPr>
           <a:xfrm rot="5400000">
-            <a:off x="4997104" y="2604100"/>
+            <a:off x="4634252" y="2604100"/>
             <a:ext cx="1355159" cy="523220"/>
           </a:xfrm>
           <a:prstGeom prst="rect">
@@ -4876,6 +4879,48 @@
               <a:rPr lang="en-US" sz="2800" dirty="0" smtClean="0"/>
               <a:t>Flat segment</a:t>
             </a:r>
+            <a:endParaRPr lang="en-US" sz="2800" dirty="0"/>
+          </a:p>
+        </p:txBody>
+      </p:sp>
+      <p:sp>
+        <p:nvSpPr>
+          <p:cNvPr id="25" name="TextBox 24"/>
+          <p:cNvSpPr txBox="1"/>
+          <p:nvPr/>
+        </p:nvSpPr>
+        <p:spPr>
+          <a:xfrm>
+            <a:off x="2301976" y="1672361"/>
+            <a:ext cx="4200273" cy="2480719"/>
+          </a:xfrm>
+          <a:prstGeom prst="rect">
+            <a:avLst/>
+          </a:prstGeom>
+          <a:noFill/>
+          <a:ln>
+            <a:solidFill>
+              <a:schemeClr val="tx2">
+                <a:lumMod val="60000"/>
+                <a:lumOff val="40000"/>
+              </a:schemeClr>
+            </a:solidFill>
+          </a:ln>
+        </p:spPr>
+        <p:txBody>
+          <a:bodyPr vert="wordArtVert" wrap="square" lIns="0" rIns="0" rtlCol="0" anchor="b" anchorCtr="0">
+            <a:noAutofit/>
+          </a:bodyPr>
+          <a:lstStyle/>
+          <a:p>
+            <a:pPr algn="ctr"/>
+            <a:r>
+              <a:rPr lang="en-US" sz="2800" dirty="0" smtClean="0"/>
+              <a:t>Snapshot</a:t>
+            </a:r>
+          </a:p>
+          <a:p>
+            <a:pPr algn="ctr"/>
             <a:endParaRPr lang="en-US" sz="2800" dirty="0"/>
           </a:p>
         </p:txBody>

</xml_diff>

<commit_message>
Changes to Section 2 and 3
</commit_message>
<xml_diff>
--- a/FAST2018-submission/LSM.pptx
+++ b/FAST2018-submission/LSM.pptx
@@ -195,7 +195,7 @@
           <a:p>
             <a:fld id="{2D6E3885-AA8A-D94C-9C8E-6B5181794B7D}" type="datetimeFigureOut">
               <a:rPr lang="en-US" smtClean="0"/>
-              <a:t>9/26/17</a:t>
+              <a:t>9/27/17</a:t>
             </a:fld>
             <a:endParaRPr lang="en-US"/>
           </a:p>
@@ -728,7 +728,7 @@
           <a:p>
             <a:fld id="{10F5D1E9-1EA1-9144-BBEF-9E786EB7675B}" type="datetimeFigureOut">
               <a:rPr lang="en-US" smtClean="0"/>
-              <a:t>9/26/17</a:t>
+              <a:t>9/27/17</a:t>
             </a:fld>
             <a:endParaRPr lang="en-US"/>
           </a:p>
@@ -898,7 +898,7 @@
           <a:p>
             <a:fld id="{10F5D1E9-1EA1-9144-BBEF-9E786EB7675B}" type="datetimeFigureOut">
               <a:rPr lang="en-US" smtClean="0"/>
-              <a:t>9/26/17</a:t>
+              <a:t>9/27/17</a:t>
             </a:fld>
             <a:endParaRPr lang="en-US"/>
           </a:p>
@@ -1078,7 +1078,7 @@
           <a:p>
             <a:fld id="{10F5D1E9-1EA1-9144-BBEF-9E786EB7675B}" type="datetimeFigureOut">
               <a:rPr lang="en-US" smtClean="0"/>
-              <a:t>9/26/17</a:t>
+              <a:t>9/27/17</a:t>
             </a:fld>
             <a:endParaRPr lang="en-US"/>
           </a:p>
@@ -1248,7 +1248,7 @@
           <a:p>
             <a:fld id="{10F5D1E9-1EA1-9144-BBEF-9E786EB7675B}" type="datetimeFigureOut">
               <a:rPr lang="en-US" smtClean="0"/>
-              <a:t>9/26/17</a:t>
+              <a:t>9/27/17</a:t>
             </a:fld>
             <a:endParaRPr lang="en-US"/>
           </a:p>
@@ -1494,7 +1494,7 @@
           <a:p>
             <a:fld id="{10F5D1E9-1EA1-9144-BBEF-9E786EB7675B}" type="datetimeFigureOut">
               <a:rPr lang="en-US" smtClean="0"/>
-              <a:t>9/26/17</a:t>
+              <a:t>9/27/17</a:t>
             </a:fld>
             <a:endParaRPr lang="en-US"/>
           </a:p>
@@ -1782,7 +1782,7 @@
           <a:p>
             <a:fld id="{10F5D1E9-1EA1-9144-BBEF-9E786EB7675B}" type="datetimeFigureOut">
               <a:rPr lang="en-US" smtClean="0"/>
-              <a:t>9/26/17</a:t>
+              <a:t>9/27/17</a:t>
             </a:fld>
             <a:endParaRPr lang="en-US"/>
           </a:p>
@@ -2204,7 +2204,7 @@
           <a:p>
             <a:fld id="{10F5D1E9-1EA1-9144-BBEF-9E786EB7675B}" type="datetimeFigureOut">
               <a:rPr lang="en-US" smtClean="0"/>
-              <a:t>9/26/17</a:t>
+              <a:t>9/27/17</a:t>
             </a:fld>
             <a:endParaRPr lang="en-US"/>
           </a:p>
@@ -2322,7 +2322,7 @@
           <a:p>
             <a:fld id="{10F5D1E9-1EA1-9144-BBEF-9E786EB7675B}" type="datetimeFigureOut">
               <a:rPr lang="en-US" smtClean="0"/>
-              <a:t>9/26/17</a:t>
+              <a:t>9/27/17</a:t>
             </a:fld>
             <a:endParaRPr lang="en-US"/>
           </a:p>
@@ -2417,7 +2417,7 @@
           <a:p>
             <a:fld id="{10F5D1E9-1EA1-9144-BBEF-9E786EB7675B}" type="datetimeFigureOut">
               <a:rPr lang="en-US" smtClean="0"/>
-              <a:t>9/26/17</a:t>
+              <a:t>9/27/17</a:t>
             </a:fld>
             <a:endParaRPr lang="en-US"/>
           </a:p>
@@ -2694,7 +2694,7 @@
           <a:p>
             <a:fld id="{10F5D1E9-1EA1-9144-BBEF-9E786EB7675B}" type="datetimeFigureOut">
               <a:rPr lang="en-US" smtClean="0"/>
-              <a:t>9/26/17</a:t>
+              <a:t>9/27/17</a:t>
             </a:fld>
             <a:endParaRPr lang="en-US"/>
           </a:p>
@@ -2947,7 +2947,7 @@
           <a:p>
             <a:fld id="{10F5D1E9-1EA1-9144-BBEF-9E786EB7675B}" type="datetimeFigureOut">
               <a:rPr lang="en-US" smtClean="0"/>
-              <a:t>9/26/17</a:t>
+              <a:t>9/27/17</a:t>
             </a:fld>
             <a:endParaRPr lang="en-US"/>
           </a:p>
@@ -3160,7 +3160,7 @@
           <a:p>
             <a:fld id="{10F5D1E9-1EA1-9144-BBEF-9E786EB7675B}" type="datetimeFigureOut">
               <a:rPr lang="en-US" smtClean="0"/>
-              <a:t>9/26/17</a:t>
+              <a:t>9/27/17</a:t>
             </a:fld>
             <a:endParaRPr lang="en-US"/>
           </a:p>
@@ -4176,7 +4176,7 @@
         </p:nvCxnSpPr>
         <p:spPr>
           <a:xfrm flipH="1">
-            <a:off x="1248675" y="4246823"/>
+            <a:off x="1241619" y="4557287"/>
             <a:ext cx="6919822" cy="0"/>
           </a:xfrm>
           <a:prstGeom prst="line">
@@ -4209,7 +4209,7 @@
         </p:nvSpPr>
         <p:spPr>
           <a:xfrm>
-            <a:off x="6365571" y="3034390"/>
+            <a:off x="6372627" y="3401302"/>
             <a:ext cx="1639848" cy="1077218"/>
           </a:xfrm>
           <a:prstGeom prst="rect">
@@ -4240,7 +4240,7 @@
         </p:nvSpPr>
         <p:spPr>
           <a:xfrm>
-            <a:off x="6860137" y="4366438"/>
+            <a:off x="6860137" y="4458166"/>
             <a:ext cx="1121600" cy="1077218"/>
           </a:xfrm>
           <a:prstGeom prst="rect">
@@ -4271,8 +4271,8 @@
         </p:nvSpPr>
         <p:spPr>
           <a:xfrm>
-            <a:off x="2409826" y="660664"/>
-            <a:ext cx="2070148" cy="954107"/>
+            <a:off x="3547847" y="660664"/>
+            <a:ext cx="2079291" cy="954107"/>
           </a:xfrm>
           <a:prstGeom prst="rect">
             <a:avLst/>
@@ -4310,7 +4310,7 @@
         </p:nvSpPr>
         <p:spPr>
           <a:xfrm>
-            <a:off x="890568" y="3559447"/>
+            <a:off x="1250424" y="4046311"/>
             <a:ext cx="892467" cy="523220"/>
           </a:xfrm>
           <a:prstGeom prst="rect">
@@ -4340,8 +4340,8 @@
         </p:nvSpPr>
         <p:spPr>
           <a:xfrm>
-            <a:off x="1335758" y="4453263"/>
-            <a:ext cx="3831774" cy="523220"/>
+            <a:off x="2974279" y="4639049"/>
+            <a:ext cx="3200400" cy="523220"/>
           </a:xfrm>
           <a:prstGeom prst="rect">
             <a:avLst/>
@@ -4383,7 +4383,7 @@
         </p:nvCxnSpPr>
         <p:spPr>
           <a:xfrm flipV="1">
-            <a:off x="3262534" y="5110634"/>
+            <a:off x="4592285" y="5209418"/>
             <a:ext cx="0" cy="419186"/>
           </a:xfrm>
           <a:prstGeom prst="line">
@@ -4419,8 +4419,8 @@
         </p:nvSpPr>
         <p:spPr>
           <a:xfrm>
-            <a:off x="1335759" y="5647070"/>
-            <a:ext cx="3831774" cy="523220"/>
+            <a:off x="2974279" y="5699096"/>
+            <a:ext cx="3200400" cy="523220"/>
           </a:xfrm>
           <a:prstGeom prst="rect">
             <a:avLst/>
@@ -4462,8 +4462,8 @@
         </p:nvSpPr>
         <p:spPr>
           <a:xfrm>
-            <a:off x="1593398" y="1016001"/>
-            <a:ext cx="616858" cy="290281"/>
+            <a:off x="1932672" y="832545"/>
+            <a:ext cx="1582944" cy="290281"/>
           </a:xfrm>
           <a:prstGeom prst="rightArrow">
             <a:avLst/>
@@ -4500,7 +4500,7 @@
         </p:nvSpPr>
         <p:spPr>
           <a:xfrm>
-            <a:off x="890568" y="866649"/>
+            <a:off x="1250424" y="683193"/>
             <a:ext cx="682248" cy="523220"/>
           </a:xfrm>
           <a:prstGeom prst="rect">
@@ -4530,7 +4530,7 @@
         </p:nvSpPr>
         <p:spPr>
           <a:xfrm>
-            <a:off x="1618000" y="3844192"/>
+            <a:off x="2350628" y="4082667"/>
             <a:ext cx="568382" cy="809179"/>
           </a:xfrm>
           <a:prstGeom prst="curvedRightArrow">
@@ -4579,7 +4579,7 @@
         </p:nvSpPr>
         <p:spPr>
           <a:xfrm>
-            <a:off x="2398939" y="1753284"/>
+            <a:off x="3546975" y="1689780"/>
             <a:ext cx="2081035" cy="523220"/>
           </a:xfrm>
           <a:prstGeom prst="rect">
@@ -4618,7 +4618,7 @@
         </p:nvCxnSpPr>
         <p:spPr>
           <a:xfrm flipV="1">
-            <a:off x="3298954" y="2349210"/>
+            <a:off x="4587492" y="2248280"/>
             <a:ext cx="0" cy="419186"/>
           </a:xfrm>
           <a:prstGeom prst="line">
@@ -4654,8 +4654,8 @@
         </p:nvSpPr>
         <p:spPr>
           <a:xfrm>
-            <a:off x="1641874" y="1365945"/>
-            <a:ext cx="568382" cy="910559"/>
+            <a:off x="2919010" y="1365945"/>
+            <a:ext cx="568382" cy="847055"/>
           </a:xfrm>
           <a:prstGeom prst="curvedRightArrow">
             <a:avLst>
@@ -4703,8 +4703,8 @@
         </p:nvSpPr>
         <p:spPr>
           <a:xfrm>
-            <a:off x="4652180" y="1790631"/>
-            <a:ext cx="437599" cy="2262911"/>
+            <a:off x="5748638" y="1677735"/>
+            <a:ext cx="437599" cy="1598439"/>
           </a:xfrm>
           <a:prstGeom prst="rightBrace">
             <a:avLst>
@@ -4744,8 +4744,8 @@
         </p:nvSpPr>
         <p:spPr>
           <a:xfrm rot="5400000">
-            <a:off x="4634252" y="2604100"/>
-            <a:ext cx="1355159" cy="523220"/>
+            <a:off x="5797112" y="2169181"/>
+            <a:ext cx="1216799" cy="461665"/>
           </a:xfrm>
           <a:prstGeom prst="rect">
             <a:avLst/>
@@ -4758,14 +4758,14 @@
           <a:lstStyle/>
           <a:p>
             <a:r>
-              <a:rPr lang="en-US" sz="2800" dirty="0" smtClean="0">
+              <a:rPr lang="en-US" sz="2400" b="1" dirty="0" smtClean="0">
                 <a:solidFill>
                   <a:prstClr val="black"/>
                 </a:solidFill>
               </a:rPr>
               <a:t>pipeline</a:t>
             </a:r>
-            <a:endParaRPr lang="en-US" dirty="0"/>
+            <a:endParaRPr lang="en-US" sz="1600" b="1" dirty="0"/>
           </a:p>
         </p:txBody>
       </p:sp>
@@ -4777,7 +4777,7 @@
         </p:nvSpPr>
         <p:spPr>
           <a:xfrm>
-            <a:off x="890568" y="2112363"/>
+            <a:off x="1250424" y="1329147"/>
             <a:ext cx="1800493" cy="954107"/>
           </a:xfrm>
           <a:prstGeom prst="rect">
@@ -4813,7 +4813,7 @@
         </p:nvSpPr>
         <p:spPr>
           <a:xfrm>
-            <a:off x="2409826" y="2943466"/>
+            <a:off x="3546975" y="2767066"/>
             <a:ext cx="2081035" cy="523220"/>
           </a:xfrm>
           <a:prstGeom prst="rect">
@@ -4852,8 +4852,8 @@
         </p:nvSpPr>
         <p:spPr>
           <a:xfrm>
-            <a:off x="2383255" y="3530322"/>
-            <a:ext cx="2107606" cy="523220"/>
+            <a:off x="3547405" y="3932514"/>
+            <a:ext cx="2080174" cy="523220"/>
           </a:xfrm>
           <a:prstGeom prst="rect">
             <a:avLst/>
@@ -4885,14 +4885,14 @@
       </p:sp>
       <p:sp>
         <p:nvSpPr>
-          <p:cNvPr id="25" name="TextBox 24"/>
+          <p:cNvPr id="26" name="TextBox 25"/>
           <p:cNvSpPr txBox="1"/>
           <p:nvPr/>
         </p:nvSpPr>
         <p:spPr>
           <a:xfrm>
-            <a:off x="2301976" y="1672361"/>
-            <a:ext cx="4200273" cy="2480719"/>
+            <a:off x="3551199" y="3342826"/>
+            <a:ext cx="2081035" cy="523220"/>
           </a:xfrm>
           <a:prstGeom prst="rect">
             <a:avLst/>
@@ -4908,20 +4908,90 @@
           </a:ln>
         </p:spPr>
         <p:txBody>
-          <a:bodyPr vert="wordArtVert" wrap="square" lIns="0" rIns="0" rtlCol="0" anchor="b" anchorCtr="0">
-            <a:noAutofit/>
+          <a:bodyPr wrap="square" rtlCol="0">
+            <a:spAutoFit/>
           </a:bodyPr>
           <a:lstStyle/>
           <a:p>
             <a:pPr algn="ctr"/>
             <a:r>
               <a:rPr lang="en-US" sz="2800" dirty="0" smtClean="0"/>
-              <a:t>Snapshot</a:t>
-            </a:r>
-          </a:p>
+              <a:t>Flat segment</a:t>
+            </a:r>
+            <a:endParaRPr lang="en-US" sz="2800" dirty="0"/>
+          </a:p>
+        </p:txBody>
+      </p:sp>
+      <p:sp>
+        <p:nvSpPr>
+          <p:cNvPr id="28" name="Rectangle 27"/>
+          <p:cNvSpPr/>
+          <p:nvPr/>
+        </p:nvSpPr>
+        <p:spPr>
+          <a:xfrm rot="16200000" flipH="1">
+            <a:off x="2440752" y="3656381"/>
+            <a:ext cx="1351652" cy="461665"/>
+          </a:xfrm>
+          <a:prstGeom prst="rect">
+            <a:avLst/>
+          </a:prstGeom>
+        </p:spPr>
+        <p:txBody>
+          <a:bodyPr wrap="none">
+            <a:spAutoFit/>
+          </a:bodyPr>
+          <a:lstStyle/>
+          <a:p>
+            <a:r>
+              <a:rPr lang="en-US" sz="2400" b="1" dirty="0" smtClean="0">
+                <a:solidFill>
+                  <a:prstClr val="black"/>
+                </a:solidFill>
+              </a:rPr>
+              <a:t>snapshot</a:t>
+            </a:r>
+            <a:endParaRPr lang="en-US" sz="1600" b="1" dirty="0"/>
+          </a:p>
+        </p:txBody>
+      </p:sp>
+      <p:sp>
+        <p:nvSpPr>
+          <p:cNvPr id="6" name="Rectangle 5"/>
+          <p:cNvSpPr/>
+          <p:nvPr/>
+        </p:nvSpPr>
+        <p:spPr>
+          <a:xfrm>
+            <a:off x="3294943" y="3317333"/>
+            <a:ext cx="2398889" cy="1161188"/>
+          </a:xfrm>
+          <a:prstGeom prst="rect">
+            <a:avLst/>
+          </a:prstGeom>
+          <a:noFill/>
+          <a:effectLst/>
+        </p:spPr>
+        <p:style>
+          <a:lnRef idx="1">
+            <a:schemeClr val="accent1"/>
+          </a:lnRef>
+          <a:fillRef idx="3">
+            <a:schemeClr val="accent1"/>
+          </a:fillRef>
+          <a:effectRef idx="2">
+            <a:schemeClr val="accent1"/>
+          </a:effectRef>
+          <a:fontRef idx="minor">
+            <a:schemeClr val="lt1"/>
+          </a:fontRef>
+        </p:style>
+        <p:txBody>
+          <a:bodyPr rtlCol="0" anchor="ctr"/>
+          <a:lstStyle/>
           <a:p>
             <a:pPr algn="ctr"/>
-            <a:endParaRPr lang="en-US" sz="2800" dirty="0"/>
+            <a:endParaRPr lang="en-US"/>
           </a:p>
         </p:txBody>
       </p:sp>

</xml_diff>